<commit_message>
Changed story names (1,3,5,7) Implemented some tasks
</commit_message>
<xml_diff>
--- a/Documentation/User Stories.pptx
+++ b/Documentation/User Stories.pptx
@@ -320,7 +320,7 @@
           <a:p>
             <a:fld id="{1585DAA5-6BE2-467A-90B2-00E985D86198}" type="datetimeFigureOut">
               <a:rPr lang="en-AU" smtClean="0"/>
-              <a:t>8/08/2012</a:t>
+              <a:t>10/08/2012</a:t>
             </a:fld>
             <a:endParaRPr lang="en-AU"/>
           </a:p>
@@ -485,7 +485,7 @@
           <a:p>
             <a:fld id="{1585DAA5-6BE2-467A-90B2-00E985D86198}" type="datetimeFigureOut">
               <a:rPr lang="en-AU" smtClean="0"/>
-              <a:t>8/08/2012</a:t>
+              <a:t>10/08/2012</a:t>
             </a:fld>
             <a:endParaRPr lang="en-AU"/>
           </a:p>
@@ -660,7 +660,7 @@
           <a:p>
             <a:fld id="{1585DAA5-6BE2-467A-90B2-00E985D86198}" type="datetimeFigureOut">
               <a:rPr lang="en-AU" smtClean="0"/>
-              <a:t>8/08/2012</a:t>
+              <a:t>10/08/2012</a:t>
             </a:fld>
             <a:endParaRPr lang="en-AU"/>
           </a:p>
@@ -825,7 +825,7 @@
           <a:p>
             <a:fld id="{1585DAA5-6BE2-467A-90B2-00E985D86198}" type="datetimeFigureOut">
               <a:rPr lang="en-AU" smtClean="0"/>
-              <a:t>8/08/2012</a:t>
+              <a:t>10/08/2012</a:t>
             </a:fld>
             <a:endParaRPr lang="en-AU"/>
           </a:p>
@@ -1066,7 +1066,7 @@
           <a:p>
             <a:fld id="{1585DAA5-6BE2-467A-90B2-00E985D86198}" type="datetimeFigureOut">
               <a:rPr lang="en-AU" smtClean="0"/>
-              <a:t>8/08/2012</a:t>
+              <a:t>10/08/2012</a:t>
             </a:fld>
             <a:endParaRPr lang="en-AU"/>
           </a:p>
@@ -1349,7 +1349,7 @@
           <a:p>
             <a:fld id="{1585DAA5-6BE2-467A-90B2-00E985D86198}" type="datetimeFigureOut">
               <a:rPr lang="en-AU" smtClean="0"/>
-              <a:t>8/08/2012</a:t>
+              <a:t>10/08/2012</a:t>
             </a:fld>
             <a:endParaRPr lang="en-AU"/>
           </a:p>
@@ -1766,7 +1766,7 @@
           <a:p>
             <a:fld id="{1585DAA5-6BE2-467A-90B2-00E985D86198}" type="datetimeFigureOut">
               <a:rPr lang="en-AU" smtClean="0"/>
-              <a:t>8/08/2012</a:t>
+              <a:t>10/08/2012</a:t>
             </a:fld>
             <a:endParaRPr lang="en-AU"/>
           </a:p>
@@ -1879,7 +1879,7 @@
           <a:p>
             <a:fld id="{1585DAA5-6BE2-467A-90B2-00E985D86198}" type="datetimeFigureOut">
               <a:rPr lang="en-AU" smtClean="0"/>
-              <a:t>8/08/2012</a:t>
+              <a:t>10/08/2012</a:t>
             </a:fld>
             <a:endParaRPr lang="en-AU"/>
           </a:p>
@@ -1969,7 +1969,7 @@
           <a:p>
             <a:fld id="{1585DAA5-6BE2-467A-90B2-00E985D86198}" type="datetimeFigureOut">
               <a:rPr lang="en-AU" smtClean="0"/>
-              <a:t>8/08/2012</a:t>
+              <a:t>10/08/2012</a:t>
             </a:fld>
             <a:endParaRPr lang="en-AU"/>
           </a:p>
@@ -2241,7 +2241,7 @@
           <a:p>
             <a:fld id="{1585DAA5-6BE2-467A-90B2-00E985D86198}" type="datetimeFigureOut">
               <a:rPr lang="en-AU" smtClean="0"/>
-              <a:t>8/08/2012</a:t>
+              <a:t>10/08/2012</a:t>
             </a:fld>
             <a:endParaRPr lang="en-AU"/>
           </a:p>
@@ -2489,7 +2489,7 @@
           <a:p>
             <a:fld id="{1585DAA5-6BE2-467A-90B2-00E985D86198}" type="datetimeFigureOut">
               <a:rPr lang="en-AU" smtClean="0"/>
-              <a:t>8/08/2012</a:t>
+              <a:t>10/08/2012</a:t>
             </a:fld>
             <a:endParaRPr lang="en-AU"/>
           </a:p>
@@ -2697,7 +2697,7 @@
           <a:p>
             <a:fld id="{1585DAA5-6BE2-467A-90B2-00E985D86198}" type="datetimeFigureOut">
               <a:rPr lang="en-AU" smtClean="0"/>
-              <a:t>8/08/2012</a:t>
+              <a:t>10/08/2012</a:t>
             </a:fld>
             <a:endParaRPr lang="en-AU"/>
           </a:p>
@@ -3177,7 +3177,7 @@
             <a:pPr algn="ctr"/>
             <a:r>
               <a:rPr lang="en-AU" sz="2800" dirty="0" smtClean="0"/>
-              <a:t>Potential Investor</a:t>
+              <a:t>Hardware cost input</a:t>
             </a:r>
             <a:endParaRPr lang="en-AU" sz="2800" dirty="0"/>
           </a:p>
@@ -3237,7 +3237,23 @@
                   <a:schemeClr val="tx1"/>
                 </a:solidFill>
               </a:rPr>
-              <a:t>As a potential solar investor I want to be able to manually enter the hardware cost so I can customise the system cost as I please.</a:t>
+              <a:t>As a potential solar investor I want to be able to manually enter the </a:t>
+            </a:r>
+            <a:r>
+              <a:rPr lang="en-AU" sz="2400" dirty="0" smtClean="0">
+                <a:solidFill>
+                  <a:schemeClr val="tx1"/>
+                </a:solidFill>
+              </a:rPr>
+              <a:t>hardware cost </a:t>
+            </a:r>
+            <a:r>
+              <a:rPr lang="en-AU" sz="2400" dirty="0" smtClean="0">
+                <a:solidFill>
+                  <a:schemeClr val="tx1"/>
+                </a:solidFill>
+              </a:rPr>
+              <a:t>so I can customise the system cost as I please.</a:t>
             </a:r>
           </a:p>
         </p:txBody>
@@ -6382,11 +6398,6 @@
               </a:rPr>
               <a:t>Must</a:t>
             </a:r>
-            <a:endParaRPr lang="en-AU" sz="2000" dirty="0">
-              <a:solidFill>
-                <a:schemeClr val="tx1"/>
-              </a:solidFill>
-            </a:endParaRPr>
           </a:p>
         </p:txBody>
       </p:sp>
@@ -6859,11 +6870,6 @@
               </a:rPr>
               <a:t>Must</a:t>
             </a:r>
-            <a:endParaRPr lang="en-AU" sz="2000" dirty="0">
-              <a:solidFill>
-                <a:schemeClr val="tx1"/>
-              </a:solidFill>
-            </a:endParaRPr>
           </a:p>
         </p:txBody>
       </p:sp>
@@ -7350,11 +7356,6 @@
               </a:rPr>
               <a:t>Must</a:t>
             </a:r>
-            <a:endParaRPr lang="en-AU" sz="2000" dirty="0">
-              <a:solidFill>
-                <a:schemeClr val="tx1"/>
-              </a:solidFill>
-            </a:endParaRPr>
           </a:p>
         </p:txBody>
       </p:sp>
@@ -7832,11 +7833,6 @@
               </a:rPr>
               <a:t>Must</a:t>
             </a:r>
-            <a:endParaRPr lang="en-AU" sz="2000" dirty="0">
-              <a:solidFill>
-                <a:schemeClr val="tx1"/>
-              </a:solidFill>
-            </a:endParaRPr>
           </a:p>
         </p:txBody>
       </p:sp>
@@ -8324,11 +8320,6 @@
               </a:rPr>
               <a:t>Must</a:t>
             </a:r>
-            <a:endParaRPr lang="en-AU" sz="2000" dirty="0">
-              <a:solidFill>
-                <a:schemeClr val="tx1"/>
-              </a:solidFill>
-            </a:endParaRPr>
           </a:p>
         </p:txBody>
       </p:sp>
@@ -9290,11 +9281,6 @@
               </a:rPr>
               <a:t>Must</a:t>
             </a:r>
-            <a:endParaRPr lang="en-AU" sz="2000" dirty="0">
-              <a:solidFill>
-                <a:schemeClr val="tx1"/>
-              </a:solidFill>
-            </a:endParaRPr>
           </a:p>
         </p:txBody>
       </p:sp>
@@ -9767,11 +9753,6 @@
               </a:rPr>
               <a:t>Must</a:t>
             </a:r>
-            <a:endParaRPr lang="en-AU" sz="2000" dirty="0">
-              <a:solidFill>
-                <a:schemeClr val="tx1"/>
-              </a:solidFill>
-            </a:endParaRPr>
           </a:p>
         </p:txBody>
       </p:sp>
@@ -10328,15 +10309,7 @@
                   <a:schemeClr val="tx1"/>
                 </a:solidFill>
               </a:rPr>
-              <a:t>16 Story points based on unknowns and </a:t>
-            </a:r>
-            <a:r>
-              <a:rPr lang="en-AU" sz="2000" dirty="0" smtClean="0">
-                <a:solidFill>
-                  <a:schemeClr val="tx1"/>
-                </a:solidFill>
-              </a:rPr>
-              <a:t>dependencies</a:t>
+              <a:t>16 Story points based on unknowns and dependencies</a:t>
             </a:r>
           </a:p>
           <a:p>
@@ -10350,15 +10323,7 @@
                   <a:schemeClr val="tx1"/>
                 </a:solidFill>
               </a:rPr>
-              <a:t>High priority based on the assignment specification.</a:t>
-            </a:r>
-            <a:r>
-              <a:rPr lang="en-AU" sz="2000" dirty="0" smtClean="0">
-                <a:solidFill>
-                  <a:schemeClr val="tx1"/>
-                </a:solidFill>
-              </a:rPr>
-              <a:t> </a:t>
+              <a:t>High priority based on the assignment specification. </a:t>
             </a:r>
             <a:endParaRPr lang="en-AU" sz="2000" dirty="0">
               <a:solidFill>
@@ -11343,15 +11308,7 @@
                   <a:schemeClr val="tx1"/>
                 </a:solidFill>
               </a:rPr>
-              <a:t>Desktop </a:t>
-            </a:r>
-            <a:r>
-              <a:rPr lang="en-AU" sz="2000" dirty="0" smtClean="0">
-                <a:solidFill>
-                  <a:schemeClr val="tx1"/>
-                </a:solidFill>
-              </a:rPr>
-              <a:t>Only</a:t>
+              <a:t>Desktop Only</a:t>
             </a:r>
           </a:p>
           <a:p>
@@ -11883,15 +11840,7 @@
                   <a:schemeClr val="tx1"/>
                 </a:solidFill>
               </a:rPr>
-              <a:t>Different formats for location entering (Addressing, Latitude &amp; Longitude</a:t>
-            </a:r>
-            <a:r>
-              <a:rPr lang="en-AU" sz="2000" dirty="0" smtClean="0">
-                <a:solidFill>
-                  <a:schemeClr val="tx1"/>
-                </a:solidFill>
-              </a:rPr>
-              <a:t>)</a:t>
+              <a:t>Different formats for location entering (Addressing, Latitude &amp; Longitude)</a:t>
             </a:r>
           </a:p>
           <a:p>
@@ -11905,15 +11854,7 @@
                   <a:schemeClr val="tx1"/>
                 </a:solidFill>
               </a:rPr>
-              <a:t>Should to Must</a:t>
-            </a:r>
-            <a:r>
-              <a:rPr lang="en-AU" sz="2000" dirty="0" smtClean="0">
-                <a:solidFill>
-                  <a:schemeClr val="tx1"/>
-                </a:solidFill>
-              </a:rPr>
-              <a:t> </a:t>
+              <a:t>Should to Must </a:t>
             </a:r>
             <a:endParaRPr lang="en-AU" sz="2000" dirty="0">
               <a:solidFill>
@@ -12429,15 +12370,7 @@
                   <a:schemeClr val="tx1"/>
                 </a:solidFill>
               </a:rPr>
-              <a:t>Mobile </a:t>
-            </a:r>
-            <a:r>
-              <a:rPr lang="en-AU" sz="2000" dirty="0" smtClean="0">
-                <a:solidFill>
-                  <a:schemeClr val="tx1"/>
-                </a:solidFill>
-              </a:rPr>
-              <a:t>only</a:t>
+              <a:t>Mobile only</a:t>
             </a:r>
           </a:p>
           <a:p>
@@ -13450,15 +13383,7 @@
                   <a:schemeClr val="tx1"/>
                 </a:solidFill>
               </a:rPr>
-              <a:t>Higher story points because of mobile implementation (tabs</a:t>
-            </a:r>
-            <a:r>
-              <a:rPr lang="en-AU" sz="2000" dirty="0" smtClean="0">
-                <a:solidFill>
-                  <a:schemeClr val="tx1"/>
-                </a:solidFill>
-              </a:rPr>
-              <a:t>?)</a:t>
+              <a:t>Higher story points because of mobile implementation (tabs?)</a:t>
             </a:r>
           </a:p>
           <a:p>
@@ -14109,9 +14034,10 @@
           <a:p>
             <a:pPr algn="ctr"/>
             <a:r>
-              <a:rPr lang="en-AU" sz="2800" dirty="0"/>
-              <a:t>Potential Investor</a:t>
-            </a:r>
+              <a:rPr lang="en-AU" sz="2800" dirty="0" smtClean="0"/>
+              <a:t>Input kW information</a:t>
+            </a:r>
+            <a:endParaRPr lang="en-AU" sz="2800" dirty="0"/>
           </a:p>
         </p:txBody>
       </p:sp>
@@ -15915,15 +15841,7 @@
                   <a:schemeClr val="tx1"/>
                 </a:solidFill>
               </a:rPr>
-              <a:t>Many things to take into account (Model, age, placement etc</a:t>
-            </a:r>
-            <a:r>
-              <a:rPr lang="en-AU" sz="2000" dirty="0" smtClean="0">
-                <a:solidFill>
-                  <a:schemeClr val="tx1"/>
-                </a:solidFill>
-              </a:rPr>
-              <a:t>.)</a:t>
+              <a:t>Many things to take into account (Model, age, placement etc.)</a:t>
             </a:r>
           </a:p>
           <a:p>
@@ -16420,15 +16338,7 @@
                   <a:schemeClr val="tx1"/>
                 </a:solidFill>
               </a:rPr>
-              <a:t>User’s system current output needs to be inputted. (another story</a:t>
-            </a:r>
-            <a:r>
-              <a:rPr lang="en-AU" sz="2000" dirty="0" smtClean="0">
-                <a:solidFill>
-                  <a:schemeClr val="tx1"/>
-                </a:solidFill>
-              </a:rPr>
-              <a:t>?)</a:t>
+              <a:t>User’s system current output needs to be inputted. (another story?)</a:t>
             </a:r>
           </a:p>
           <a:p>
@@ -16874,11 +16784,6 @@
               </a:rPr>
               <a:t>Must</a:t>
             </a:r>
-            <a:endParaRPr lang="en-AU" sz="2000" dirty="0">
-              <a:solidFill>
-                <a:schemeClr val="tx1"/>
-              </a:solidFill>
-            </a:endParaRPr>
           </a:p>
         </p:txBody>
       </p:sp>
@@ -17104,7 +17009,7 @@
             <a:pPr algn="ctr"/>
             <a:r>
               <a:rPr lang="en-AU" sz="2800" dirty="0" smtClean="0"/>
-              <a:t>Potential Investor</a:t>
+              <a:t>Input panel distribution</a:t>
             </a:r>
             <a:endParaRPr lang="en-AU" sz="2800" dirty="0"/>
           </a:p>
@@ -17358,11 +17263,6 @@
               </a:rPr>
               <a:t>Must</a:t>
             </a:r>
-            <a:endParaRPr lang="en-AU" sz="2000" dirty="0">
-              <a:solidFill>
-                <a:schemeClr val="tx1"/>
-              </a:solidFill>
-            </a:endParaRPr>
           </a:p>
         </p:txBody>
       </p:sp>
@@ -17903,15 +17803,7 @@
                   <a:schemeClr val="tx1"/>
                 </a:solidFill>
               </a:rPr>
-              <a:t> DEPENDENCY on Story (5</a:t>
-            </a:r>
-            <a:r>
-              <a:rPr lang="en-AU" sz="2000" dirty="0" smtClean="0">
-                <a:solidFill>
-                  <a:schemeClr val="tx1"/>
-                </a:solidFill>
-              </a:rPr>
-              <a:t>)</a:t>
+              <a:t> DEPENDENCY on Story (5)</a:t>
             </a:r>
           </a:p>
           <a:p>
@@ -18075,7 +17967,11 @@
             <a:pPr algn="ctr"/>
             <a:r>
               <a:rPr lang="en-AU" sz="2800" dirty="0" smtClean="0"/>
-              <a:t>Potential Investor</a:t>
+              <a:t>Input </a:t>
+            </a:r>
+            <a:r>
+              <a:rPr lang="en-AU" sz="2800" smtClean="0"/>
+              <a:t>efficiency data</a:t>
             </a:r>
             <a:endParaRPr lang="en-AU" sz="2800" dirty="0"/>
           </a:p>
@@ -18353,11 +18249,6 @@
               </a:rPr>
               <a:t>Must</a:t>
             </a:r>
-            <a:endParaRPr lang="en-AU" sz="2000" dirty="0">
-              <a:solidFill>
-                <a:schemeClr val="tx1"/>
-              </a:solidFill>
-            </a:endParaRPr>
           </a:p>
         </p:txBody>
       </p:sp>
@@ -19002,320 +18893,320 @@
           <a:p>
             <a:pPr algn="ctr"/>
             <a:r>
-              <a:rPr lang="en-AU" sz="2000" dirty="0">
+              <a:rPr lang="en-AU" sz="2000" dirty="0" smtClean="0">
                 <a:solidFill>
                   <a:schemeClr val="tx1"/>
                 </a:solidFill>
               </a:rPr>
               <a:t>9</a:t>
-            </a:r>
-          </a:p>
-        </p:txBody>
-      </p:sp>
-      <p:sp>
-        <p:nvSpPr>
-          <p:cNvPr id="6" name="Rectangle 5"/>
-          <p:cNvSpPr/>
-          <p:nvPr/>
-        </p:nvSpPr>
-        <p:spPr>
-          <a:xfrm>
-            <a:off x="831153" y="109410"/>
-            <a:ext cx="7380000" cy="540000"/>
-          </a:xfrm>
-          <a:prstGeom prst="rect">
-            <a:avLst/>
-          </a:prstGeom>
-          <a:ln>
-            <a:solidFill>
-              <a:schemeClr val="accent1">
-                <a:lumMod val="50000"/>
-              </a:schemeClr>
-            </a:solidFill>
-          </a:ln>
-        </p:spPr>
-        <p:style>
-          <a:lnRef idx="2">
-            <a:schemeClr val="accent1">
-              <a:shade val="50000"/>
-            </a:schemeClr>
-          </a:lnRef>
-          <a:fillRef idx="1">
-            <a:schemeClr val="accent1"/>
-          </a:fillRef>
-          <a:effectRef idx="0">
-            <a:schemeClr val="accent1"/>
-          </a:effectRef>
-          <a:fontRef idx="minor">
-            <a:schemeClr val="lt1"/>
-          </a:fontRef>
-        </p:style>
-        <p:txBody>
-          <a:bodyPr rtlCol="0" anchor="ctr"/>
-          <a:lstStyle/>
-          <a:p>
-            <a:pPr algn="ctr"/>
-            <a:r>
-              <a:rPr lang="en-AU" sz="2800" dirty="0" smtClean="0"/>
-              <a:t>Potential Investor</a:t>
-            </a:r>
-            <a:endParaRPr lang="en-AU" sz="2800" dirty="0"/>
-          </a:p>
-        </p:txBody>
-      </p:sp>
-      <p:sp>
-        <p:nvSpPr>
-          <p:cNvPr id="7" name="Rectangle 6"/>
-          <p:cNvSpPr/>
-          <p:nvPr/>
-        </p:nvSpPr>
-        <p:spPr>
-          <a:xfrm>
-            <a:off x="39153" y="822470"/>
-            <a:ext cx="9828000" cy="2340000"/>
-          </a:xfrm>
-          <a:prstGeom prst="rect">
-            <a:avLst/>
-          </a:prstGeom>
-          <a:solidFill>
-            <a:schemeClr val="tx2">
-              <a:lumMod val="20000"/>
-              <a:lumOff val="80000"/>
-            </a:schemeClr>
-          </a:solidFill>
-          <a:ln>
-            <a:solidFill>
-              <a:schemeClr val="accent1">
-                <a:lumMod val="50000"/>
-              </a:schemeClr>
-            </a:solidFill>
-          </a:ln>
-        </p:spPr>
-        <p:style>
-          <a:lnRef idx="2">
-            <a:schemeClr val="accent1">
-              <a:shade val="50000"/>
-            </a:schemeClr>
-          </a:lnRef>
-          <a:fillRef idx="1">
-            <a:schemeClr val="accent1"/>
-          </a:fillRef>
-          <a:effectRef idx="0">
-            <a:schemeClr val="accent1"/>
-          </a:effectRef>
-          <a:fontRef idx="minor">
-            <a:schemeClr val="lt1"/>
-          </a:fontRef>
-        </p:style>
-        <p:txBody>
-          <a:bodyPr rtlCol="0" anchor="t" anchorCtr="0"/>
-          <a:lstStyle/>
-          <a:p>
-            <a:r>
-              <a:rPr lang="en-AU" sz="2400" dirty="0" smtClean="0">
-                <a:solidFill>
-                  <a:schemeClr val="tx1"/>
-                </a:solidFill>
-              </a:rPr>
-              <a:t>As a potential solar investor I want to be able to input a panel lifetime in years so I can customise the panel lifetime as I please. </a:t>
-            </a:r>
-          </a:p>
-        </p:txBody>
-      </p:sp>
-      <p:sp>
-        <p:nvSpPr>
-          <p:cNvPr id="8" name="Rectangle 7"/>
-          <p:cNvSpPr/>
-          <p:nvPr/>
-        </p:nvSpPr>
-        <p:spPr>
-          <a:xfrm>
-            <a:off x="39153" y="3335530"/>
-            <a:ext cx="9828000" cy="1620000"/>
-          </a:xfrm>
-          <a:prstGeom prst="rect">
-            <a:avLst/>
-          </a:prstGeom>
-          <a:solidFill>
-            <a:schemeClr val="accent1">
-              <a:lumMod val="20000"/>
-              <a:lumOff val="80000"/>
-            </a:schemeClr>
-          </a:solidFill>
-          <a:ln>
-            <a:solidFill>
-              <a:schemeClr val="accent1">
-                <a:lumMod val="50000"/>
-              </a:schemeClr>
-            </a:solidFill>
-          </a:ln>
-        </p:spPr>
-        <p:style>
-          <a:lnRef idx="2">
-            <a:schemeClr val="accent1">
-              <a:shade val="50000"/>
-            </a:schemeClr>
-          </a:lnRef>
-          <a:fillRef idx="1">
-            <a:schemeClr val="accent1"/>
-          </a:fillRef>
-          <a:effectRef idx="0">
-            <a:schemeClr val="accent1"/>
-          </a:effectRef>
-          <a:fontRef idx="minor">
-            <a:schemeClr val="lt1"/>
-          </a:fontRef>
-        </p:style>
-        <p:txBody>
-          <a:bodyPr tIns="36000" rtlCol="0" anchor="t" anchorCtr="0"/>
-          <a:lstStyle/>
-          <a:p>
-            <a:r>
-              <a:rPr lang="en-AU" sz="2000" dirty="0" smtClean="0">
-                <a:solidFill>
-                  <a:schemeClr val="tx1"/>
-                </a:solidFill>
-              </a:rPr>
-              <a:t>Acceptance Criteria</a:t>
-            </a:r>
-          </a:p>
-          <a:p>
-            <a:pPr marL="179388" indent="-179388">
-              <a:buFont typeface="Arial" pitchFamily="34" charset="0"/>
-              <a:buChar char="•"/>
-            </a:pPr>
-            <a:r>
-              <a:rPr lang="en-AU" sz="2000" dirty="0" smtClean="0">
-                <a:solidFill>
-                  <a:schemeClr val="tx1"/>
-                </a:solidFill>
-              </a:rPr>
-              <a:t> The user is able to input the panel lifetime in years</a:t>
-            </a:r>
-          </a:p>
-        </p:txBody>
-      </p:sp>
-      <p:sp>
-        <p:nvSpPr>
-          <p:cNvPr id="11" name="Rectangle 10"/>
-          <p:cNvSpPr/>
-          <p:nvPr/>
-        </p:nvSpPr>
-        <p:spPr>
-          <a:xfrm>
-            <a:off x="9147153" y="109410"/>
-            <a:ext cx="720000" cy="540000"/>
-          </a:xfrm>
-          <a:prstGeom prst="rect">
-            <a:avLst/>
-          </a:prstGeom>
-          <a:solidFill>
-            <a:srgbClr val="CCF0CD">
-              <a:alpha val="20000"/>
-            </a:srgbClr>
-          </a:solidFill>
-          <a:ln>
-            <a:solidFill>
-              <a:schemeClr val="accent1">
-                <a:lumMod val="50000"/>
-              </a:schemeClr>
-            </a:solidFill>
-          </a:ln>
-        </p:spPr>
-        <p:style>
-          <a:lnRef idx="2">
-            <a:schemeClr val="accent1">
-              <a:shade val="50000"/>
-            </a:schemeClr>
-          </a:lnRef>
-          <a:fillRef idx="1">
-            <a:schemeClr val="accent1"/>
-          </a:fillRef>
-          <a:effectRef idx="0">
-            <a:schemeClr val="accent1"/>
-          </a:effectRef>
-          <a:fontRef idx="minor">
-            <a:schemeClr val="lt1"/>
-          </a:fontRef>
-        </p:style>
-        <p:txBody>
-          <a:bodyPr wrap="square" lIns="0" rIns="0" rtlCol="0" anchor="ctr"/>
-          <a:lstStyle/>
-          <a:p>
-            <a:pPr algn="ctr"/>
-            <a:r>
-              <a:rPr lang="en-AU" sz="2000" dirty="0">
-                <a:solidFill>
-                  <a:schemeClr val="tx1"/>
-                </a:solidFill>
-              </a:rPr>
-              <a:t>1</a:t>
-            </a:r>
-          </a:p>
-        </p:txBody>
-      </p:sp>
-      <p:sp>
-        <p:nvSpPr>
-          <p:cNvPr id="12" name="Rectangle 11"/>
-          <p:cNvSpPr/>
-          <p:nvPr/>
-        </p:nvSpPr>
-        <p:spPr>
-          <a:xfrm>
-            <a:off x="8283153" y="109410"/>
-            <a:ext cx="792000" cy="540000"/>
-          </a:xfrm>
-          <a:prstGeom prst="rect">
-            <a:avLst/>
-          </a:prstGeom>
-          <a:solidFill>
-            <a:schemeClr val="accent4">
-              <a:lumMod val="20000"/>
-              <a:lumOff val="80000"/>
-            </a:schemeClr>
-          </a:solidFill>
-          <a:ln>
-            <a:solidFill>
-              <a:schemeClr val="accent1">
-                <a:lumMod val="50000"/>
-              </a:schemeClr>
-            </a:solidFill>
-          </a:ln>
-        </p:spPr>
-        <p:style>
-          <a:lnRef idx="2">
-            <a:schemeClr val="accent1">
-              <a:shade val="50000"/>
-            </a:schemeClr>
-          </a:lnRef>
-          <a:fillRef idx="1">
-            <a:schemeClr val="accent1"/>
-          </a:fillRef>
-          <a:effectRef idx="0">
-            <a:schemeClr val="accent1"/>
-          </a:effectRef>
-          <a:fontRef idx="minor">
-            <a:schemeClr val="lt1"/>
-          </a:fontRef>
-        </p:style>
-        <p:txBody>
-          <a:bodyPr wrap="none" lIns="0" rIns="0" rtlCol="0" anchor="ctr"/>
-          <a:lstStyle/>
-          <a:p>
-            <a:pPr algn="ctr"/>
-            <a:r>
-              <a:rPr lang="en-AU" sz="2000" dirty="0">
-                <a:solidFill>
-                  <a:schemeClr val="tx1"/>
-                </a:solidFill>
-              </a:rPr>
-              <a:t>Must</a:t>
             </a:r>
             <a:endParaRPr lang="en-AU" sz="2000" dirty="0">
               <a:solidFill>
                 <a:schemeClr val="tx1"/>
               </a:solidFill>
             </a:endParaRPr>
+          </a:p>
+        </p:txBody>
+      </p:sp>
+      <p:sp>
+        <p:nvSpPr>
+          <p:cNvPr id="6" name="Rectangle 5"/>
+          <p:cNvSpPr/>
+          <p:nvPr/>
+        </p:nvSpPr>
+        <p:spPr>
+          <a:xfrm>
+            <a:off x="831153" y="109410"/>
+            <a:ext cx="7380000" cy="540000"/>
+          </a:xfrm>
+          <a:prstGeom prst="rect">
+            <a:avLst/>
+          </a:prstGeom>
+          <a:ln>
+            <a:solidFill>
+              <a:schemeClr val="accent1">
+                <a:lumMod val="50000"/>
+              </a:schemeClr>
+            </a:solidFill>
+          </a:ln>
+        </p:spPr>
+        <p:style>
+          <a:lnRef idx="2">
+            <a:schemeClr val="accent1">
+              <a:shade val="50000"/>
+            </a:schemeClr>
+          </a:lnRef>
+          <a:fillRef idx="1">
+            <a:schemeClr val="accent1"/>
+          </a:fillRef>
+          <a:effectRef idx="0">
+            <a:schemeClr val="accent1"/>
+          </a:effectRef>
+          <a:fontRef idx="minor">
+            <a:schemeClr val="lt1"/>
+          </a:fontRef>
+        </p:style>
+        <p:txBody>
+          <a:bodyPr rtlCol="0" anchor="ctr"/>
+          <a:lstStyle/>
+          <a:p>
+            <a:pPr algn="ctr"/>
+            <a:r>
+              <a:rPr lang="en-AU" sz="2800" dirty="0" smtClean="0"/>
+              <a:t>Potential Investor</a:t>
+            </a:r>
+            <a:endParaRPr lang="en-AU" sz="2800" dirty="0"/>
+          </a:p>
+        </p:txBody>
+      </p:sp>
+      <p:sp>
+        <p:nvSpPr>
+          <p:cNvPr id="7" name="Rectangle 6"/>
+          <p:cNvSpPr/>
+          <p:nvPr/>
+        </p:nvSpPr>
+        <p:spPr>
+          <a:xfrm>
+            <a:off x="39153" y="822470"/>
+            <a:ext cx="9828000" cy="2340000"/>
+          </a:xfrm>
+          <a:prstGeom prst="rect">
+            <a:avLst/>
+          </a:prstGeom>
+          <a:solidFill>
+            <a:schemeClr val="tx2">
+              <a:lumMod val="20000"/>
+              <a:lumOff val="80000"/>
+            </a:schemeClr>
+          </a:solidFill>
+          <a:ln>
+            <a:solidFill>
+              <a:schemeClr val="accent1">
+                <a:lumMod val="50000"/>
+              </a:schemeClr>
+            </a:solidFill>
+          </a:ln>
+        </p:spPr>
+        <p:style>
+          <a:lnRef idx="2">
+            <a:schemeClr val="accent1">
+              <a:shade val="50000"/>
+            </a:schemeClr>
+          </a:lnRef>
+          <a:fillRef idx="1">
+            <a:schemeClr val="accent1"/>
+          </a:fillRef>
+          <a:effectRef idx="0">
+            <a:schemeClr val="accent1"/>
+          </a:effectRef>
+          <a:fontRef idx="minor">
+            <a:schemeClr val="lt1"/>
+          </a:fontRef>
+        </p:style>
+        <p:txBody>
+          <a:bodyPr rtlCol="0" anchor="t" anchorCtr="0"/>
+          <a:lstStyle/>
+          <a:p>
+            <a:r>
+              <a:rPr lang="en-AU" sz="2400" dirty="0" smtClean="0">
+                <a:solidFill>
+                  <a:schemeClr val="tx1"/>
+                </a:solidFill>
+              </a:rPr>
+              <a:t>As a potential solar investor I want to be able to input a panel lifetime in years so I can customise the panel lifetime as I please. </a:t>
+            </a:r>
+          </a:p>
+        </p:txBody>
+      </p:sp>
+      <p:sp>
+        <p:nvSpPr>
+          <p:cNvPr id="8" name="Rectangle 7"/>
+          <p:cNvSpPr/>
+          <p:nvPr/>
+        </p:nvSpPr>
+        <p:spPr>
+          <a:xfrm>
+            <a:off x="39153" y="3335530"/>
+            <a:ext cx="9828000" cy="1620000"/>
+          </a:xfrm>
+          <a:prstGeom prst="rect">
+            <a:avLst/>
+          </a:prstGeom>
+          <a:solidFill>
+            <a:schemeClr val="accent1">
+              <a:lumMod val="20000"/>
+              <a:lumOff val="80000"/>
+            </a:schemeClr>
+          </a:solidFill>
+          <a:ln>
+            <a:solidFill>
+              <a:schemeClr val="accent1">
+                <a:lumMod val="50000"/>
+              </a:schemeClr>
+            </a:solidFill>
+          </a:ln>
+        </p:spPr>
+        <p:style>
+          <a:lnRef idx="2">
+            <a:schemeClr val="accent1">
+              <a:shade val="50000"/>
+            </a:schemeClr>
+          </a:lnRef>
+          <a:fillRef idx="1">
+            <a:schemeClr val="accent1"/>
+          </a:fillRef>
+          <a:effectRef idx="0">
+            <a:schemeClr val="accent1"/>
+          </a:effectRef>
+          <a:fontRef idx="minor">
+            <a:schemeClr val="lt1"/>
+          </a:fontRef>
+        </p:style>
+        <p:txBody>
+          <a:bodyPr tIns="36000" rtlCol="0" anchor="t" anchorCtr="0"/>
+          <a:lstStyle/>
+          <a:p>
+            <a:r>
+              <a:rPr lang="en-AU" sz="2000" dirty="0" smtClean="0">
+                <a:solidFill>
+                  <a:schemeClr val="tx1"/>
+                </a:solidFill>
+              </a:rPr>
+              <a:t>Acceptance Criteria</a:t>
+            </a:r>
+          </a:p>
+          <a:p>
+            <a:pPr marL="179388" indent="-179388">
+              <a:buFont typeface="Arial" pitchFamily="34" charset="0"/>
+              <a:buChar char="•"/>
+            </a:pPr>
+            <a:r>
+              <a:rPr lang="en-AU" sz="2000" dirty="0" smtClean="0">
+                <a:solidFill>
+                  <a:schemeClr val="tx1"/>
+                </a:solidFill>
+              </a:rPr>
+              <a:t> The user is able to input the panel lifetime in years</a:t>
+            </a:r>
+          </a:p>
+        </p:txBody>
+      </p:sp>
+      <p:sp>
+        <p:nvSpPr>
+          <p:cNvPr id="11" name="Rectangle 10"/>
+          <p:cNvSpPr/>
+          <p:nvPr/>
+        </p:nvSpPr>
+        <p:spPr>
+          <a:xfrm>
+            <a:off x="9147153" y="109410"/>
+            <a:ext cx="720000" cy="540000"/>
+          </a:xfrm>
+          <a:prstGeom prst="rect">
+            <a:avLst/>
+          </a:prstGeom>
+          <a:solidFill>
+            <a:srgbClr val="CCF0CD">
+              <a:alpha val="20000"/>
+            </a:srgbClr>
+          </a:solidFill>
+          <a:ln>
+            <a:solidFill>
+              <a:schemeClr val="accent1">
+                <a:lumMod val="50000"/>
+              </a:schemeClr>
+            </a:solidFill>
+          </a:ln>
+        </p:spPr>
+        <p:style>
+          <a:lnRef idx="2">
+            <a:schemeClr val="accent1">
+              <a:shade val="50000"/>
+            </a:schemeClr>
+          </a:lnRef>
+          <a:fillRef idx="1">
+            <a:schemeClr val="accent1"/>
+          </a:fillRef>
+          <a:effectRef idx="0">
+            <a:schemeClr val="accent1"/>
+          </a:effectRef>
+          <a:fontRef idx="minor">
+            <a:schemeClr val="lt1"/>
+          </a:fontRef>
+        </p:style>
+        <p:txBody>
+          <a:bodyPr wrap="square" lIns="0" rIns="0" rtlCol="0" anchor="ctr"/>
+          <a:lstStyle/>
+          <a:p>
+            <a:pPr algn="ctr"/>
+            <a:r>
+              <a:rPr lang="en-AU" sz="2000" dirty="0">
+                <a:solidFill>
+                  <a:schemeClr val="tx1"/>
+                </a:solidFill>
+              </a:rPr>
+              <a:t>1</a:t>
+            </a:r>
+          </a:p>
+        </p:txBody>
+      </p:sp>
+      <p:sp>
+        <p:nvSpPr>
+          <p:cNvPr id="12" name="Rectangle 11"/>
+          <p:cNvSpPr/>
+          <p:nvPr/>
+        </p:nvSpPr>
+        <p:spPr>
+          <a:xfrm>
+            <a:off x="8283153" y="109410"/>
+            <a:ext cx="792000" cy="540000"/>
+          </a:xfrm>
+          <a:prstGeom prst="rect">
+            <a:avLst/>
+          </a:prstGeom>
+          <a:solidFill>
+            <a:schemeClr val="accent4">
+              <a:lumMod val="20000"/>
+              <a:lumOff val="80000"/>
+            </a:schemeClr>
+          </a:solidFill>
+          <a:ln>
+            <a:solidFill>
+              <a:schemeClr val="accent1">
+                <a:lumMod val="50000"/>
+              </a:schemeClr>
+            </a:solidFill>
+          </a:ln>
+        </p:spPr>
+        <p:style>
+          <a:lnRef idx="2">
+            <a:schemeClr val="accent1">
+              <a:shade val="50000"/>
+            </a:schemeClr>
+          </a:lnRef>
+          <a:fillRef idx="1">
+            <a:schemeClr val="accent1"/>
+          </a:fillRef>
+          <a:effectRef idx="0">
+            <a:schemeClr val="accent1"/>
+          </a:effectRef>
+          <a:fontRef idx="minor">
+            <a:schemeClr val="lt1"/>
+          </a:fontRef>
+        </p:style>
+        <p:txBody>
+          <a:bodyPr wrap="none" lIns="0" rIns="0" rtlCol="0" anchor="ctr"/>
+          <a:lstStyle/>
+          <a:p>
+            <a:pPr algn="ctr"/>
+            <a:r>
+              <a:rPr lang="en-AU" sz="2000" dirty="0">
+                <a:solidFill>
+                  <a:schemeClr val="tx1"/>
+                </a:solidFill>
+              </a:rPr>
+              <a:t>Must</a:t>
+            </a:r>
           </a:p>
         </p:txBody>
       </p:sp>

</xml_diff>

<commit_message>
First release and related iterations laid out. Esimates for tasks needed.
</commit_message>
<xml_diff>
--- a/Documentation/User Stories.pptx
+++ b/Documentation/User Stories.pptx
@@ -320,7 +320,7 @@
           <a:p>
             <a:fld id="{1585DAA5-6BE2-467A-90B2-00E985D86198}" type="datetimeFigureOut">
               <a:rPr lang="en-AU" smtClean="0"/>
-              <a:t>10/08/2012</a:t>
+              <a:t>15/08/2012</a:t>
             </a:fld>
             <a:endParaRPr lang="en-AU"/>
           </a:p>
@@ -485,7 +485,7 @@
           <a:p>
             <a:fld id="{1585DAA5-6BE2-467A-90B2-00E985D86198}" type="datetimeFigureOut">
               <a:rPr lang="en-AU" smtClean="0"/>
-              <a:t>10/08/2012</a:t>
+              <a:t>15/08/2012</a:t>
             </a:fld>
             <a:endParaRPr lang="en-AU"/>
           </a:p>
@@ -660,7 +660,7 @@
           <a:p>
             <a:fld id="{1585DAA5-6BE2-467A-90B2-00E985D86198}" type="datetimeFigureOut">
               <a:rPr lang="en-AU" smtClean="0"/>
-              <a:t>10/08/2012</a:t>
+              <a:t>15/08/2012</a:t>
             </a:fld>
             <a:endParaRPr lang="en-AU"/>
           </a:p>
@@ -825,7 +825,7 @@
           <a:p>
             <a:fld id="{1585DAA5-6BE2-467A-90B2-00E985D86198}" type="datetimeFigureOut">
               <a:rPr lang="en-AU" smtClean="0"/>
-              <a:t>10/08/2012</a:t>
+              <a:t>15/08/2012</a:t>
             </a:fld>
             <a:endParaRPr lang="en-AU"/>
           </a:p>
@@ -1066,7 +1066,7 @@
           <a:p>
             <a:fld id="{1585DAA5-6BE2-467A-90B2-00E985D86198}" type="datetimeFigureOut">
               <a:rPr lang="en-AU" smtClean="0"/>
-              <a:t>10/08/2012</a:t>
+              <a:t>15/08/2012</a:t>
             </a:fld>
             <a:endParaRPr lang="en-AU"/>
           </a:p>
@@ -1349,7 +1349,7 @@
           <a:p>
             <a:fld id="{1585DAA5-6BE2-467A-90B2-00E985D86198}" type="datetimeFigureOut">
               <a:rPr lang="en-AU" smtClean="0"/>
-              <a:t>10/08/2012</a:t>
+              <a:t>15/08/2012</a:t>
             </a:fld>
             <a:endParaRPr lang="en-AU"/>
           </a:p>
@@ -1766,7 +1766,7 @@
           <a:p>
             <a:fld id="{1585DAA5-6BE2-467A-90B2-00E985D86198}" type="datetimeFigureOut">
               <a:rPr lang="en-AU" smtClean="0"/>
-              <a:t>10/08/2012</a:t>
+              <a:t>15/08/2012</a:t>
             </a:fld>
             <a:endParaRPr lang="en-AU"/>
           </a:p>
@@ -1879,7 +1879,7 @@
           <a:p>
             <a:fld id="{1585DAA5-6BE2-467A-90B2-00E985D86198}" type="datetimeFigureOut">
               <a:rPr lang="en-AU" smtClean="0"/>
-              <a:t>10/08/2012</a:t>
+              <a:t>15/08/2012</a:t>
             </a:fld>
             <a:endParaRPr lang="en-AU"/>
           </a:p>
@@ -1969,7 +1969,7 @@
           <a:p>
             <a:fld id="{1585DAA5-6BE2-467A-90B2-00E985D86198}" type="datetimeFigureOut">
               <a:rPr lang="en-AU" smtClean="0"/>
-              <a:t>10/08/2012</a:t>
+              <a:t>15/08/2012</a:t>
             </a:fld>
             <a:endParaRPr lang="en-AU"/>
           </a:p>
@@ -2241,7 +2241,7 @@
           <a:p>
             <a:fld id="{1585DAA5-6BE2-467A-90B2-00E985D86198}" type="datetimeFigureOut">
               <a:rPr lang="en-AU" smtClean="0"/>
-              <a:t>10/08/2012</a:t>
+              <a:t>15/08/2012</a:t>
             </a:fld>
             <a:endParaRPr lang="en-AU"/>
           </a:p>
@@ -2489,7 +2489,7 @@
           <a:p>
             <a:fld id="{1585DAA5-6BE2-467A-90B2-00E985D86198}" type="datetimeFigureOut">
               <a:rPr lang="en-AU" smtClean="0"/>
-              <a:t>10/08/2012</a:t>
+              <a:t>15/08/2012</a:t>
             </a:fld>
             <a:endParaRPr lang="en-AU"/>
           </a:p>
@@ -2697,7 +2697,7 @@
           <a:p>
             <a:fld id="{1585DAA5-6BE2-467A-90B2-00E985D86198}" type="datetimeFigureOut">
               <a:rPr lang="en-AU" smtClean="0"/>
-              <a:t>10/08/2012</a:t>
+              <a:t>15/08/2012</a:t>
             </a:fld>
             <a:endParaRPr lang="en-AU"/>
           </a:p>
@@ -3237,23 +3237,7 @@
                   <a:schemeClr val="tx1"/>
                 </a:solidFill>
               </a:rPr>
-              <a:t>As a potential solar investor I want to be able to manually enter the </a:t>
-            </a:r>
-            <a:r>
-              <a:rPr lang="en-AU" sz="2400" dirty="0" smtClean="0">
-                <a:solidFill>
-                  <a:schemeClr val="tx1"/>
-                </a:solidFill>
-              </a:rPr>
-              <a:t>hardware cost </a:t>
-            </a:r>
-            <a:r>
-              <a:rPr lang="en-AU" sz="2400" dirty="0" smtClean="0">
-                <a:solidFill>
-                  <a:schemeClr val="tx1"/>
-                </a:solidFill>
-              </a:rPr>
-              <a:t>so I can customise the system cost as I please.</a:t>
+              <a:t>As a potential solar investor I want to be able to manually enter the hardware cost so I can customise the system cost as I please.</a:t>
             </a:r>
           </a:p>
         </p:txBody>
@@ -3677,7 +3661,7 @@
             <a:pPr algn="ctr"/>
             <a:r>
               <a:rPr lang="en-AU" sz="2800" dirty="0" smtClean="0"/>
-              <a:t>Potential Investor</a:t>
+              <a:t>Panel lifetime fetching</a:t>
             </a:r>
             <a:endParaRPr lang="en-AU" sz="2800" dirty="0"/>
           </a:p>
@@ -4154,7 +4138,7 @@
             <a:pPr algn="ctr"/>
             <a:r>
               <a:rPr lang="en-AU" sz="2800" dirty="0" smtClean="0"/>
-              <a:t>Potential Investor</a:t>
+              <a:t>Efficiency estimation</a:t>
             </a:r>
             <a:endParaRPr lang="en-AU" sz="2800" dirty="0"/>
           </a:p>
@@ -4653,7 +4637,7 @@
             <a:pPr algn="ctr"/>
             <a:r>
               <a:rPr lang="en-AU" sz="2800" dirty="0" smtClean="0"/>
-              <a:t>Potential Investor</a:t>
+              <a:t>Tariff rate input</a:t>
             </a:r>
             <a:endParaRPr lang="en-AU" sz="2800" dirty="0"/>
           </a:p>
@@ -5130,7 +5114,7 @@
             <a:pPr algn="ctr"/>
             <a:r>
               <a:rPr lang="en-AU" sz="2800" dirty="0" smtClean="0"/>
-              <a:t>Potential Investor</a:t>
+              <a:t>Tariff rate fetching</a:t>
             </a:r>
             <a:endParaRPr lang="en-AU" sz="2800" dirty="0"/>
           </a:p>
@@ -5626,7 +5610,7 @@
             <a:pPr algn="ctr"/>
             <a:r>
               <a:rPr lang="en-AU" sz="2800" dirty="0" smtClean="0"/>
-              <a:t>Potential Investor</a:t>
+              <a:t>Display power generation</a:t>
             </a:r>
             <a:endParaRPr lang="en-AU" sz="2800" dirty="0"/>
           </a:p>
@@ -6144,7 +6128,7 @@
             <a:pPr algn="ctr"/>
             <a:r>
               <a:rPr lang="en-AU" sz="2800" dirty="0" smtClean="0"/>
-              <a:t>Potential Investor</a:t>
+              <a:t>Input inverter efficiency</a:t>
             </a:r>
             <a:endParaRPr lang="en-AU" sz="2800" dirty="0"/>
           </a:p>
@@ -6616,7 +6600,7 @@
             <a:pPr algn="ctr"/>
             <a:r>
               <a:rPr lang="en-AU" sz="2800" dirty="0" smtClean="0"/>
-              <a:t>Potential Investor</a:t>
+              <a:t>Factoring in inverter cost</a:t>
             </a:r>
             <a:endParaRPr lang="en-AU" sz="2800" dirty="0"/>
           </a:p>
@@ -7102,7 +7086,7 @@
             <a:pPr algn="ctr"/>
             <a:r>
               <a:rPr lang="en-AU" sz="2800" dirty="0" smtClean="0"/>
-              <a:t>Potential Investor</a:t>
+              <a:t>Daily power usage input</a:t>
             </a:r>
             <a:endParaRPr lang="en-AU" sz="2800" dirty="0"/>
           </a:p>
@@ -7574,7 +7558,7 @@
             <a:pPr algn="ctr"/>
             <a:r>
               <a:rPr lang="en-AU" sz="2800" dirty="0" smtClean="0"/>
-              <a:t>Potential Investor</a:t>
+              <a:t>Average daytime hourly power usage</a:t>
             </a:r>
             <a:endParaRPr lang="en-AU" sz="2800" dirty="0"/>
           </a:p>
@@ -8061,7 +8045,7 @@
             <a:pPr algn="ctr"/>
             <a:r>
               <a:rPr lang="en-AU" sz="2800" dirty="0" smtClean="0"/>
-              <a:t>Potential Investor</a:t>
+              <a:t>Inverter lifetime input</a:t>
             </a:r>
             <a:endParaRPr lang="en-AU" sz="2800" dirty="0"/>
           </a:p>
@@ -8538,7 +8522,7 @@
             <a:pPr algn="ctr"/>
             <a:r>
               <a:rPr lang="en-AU" sz="2800" dirty="0" smtClean="0"/>
-              <a:t>Potential Investor</a:t>
+              <a:t>Hardware cost fetching</a:t>
             </a:r>
             <a:endParaRPr lang="en-AU" sz="2800" dirty="0"/>
           </a:p>
@@ -9027,7 +9011,7 @@
             <a:pPr algn="ctr"/>
             <a:r>
               <a:rPr lang="en-AU" sz="2800" dirty="0" smtClean="0"/>
-              <a:t>Potential Investor</a:t>
+              <a:t>Monthly power usage input</a:t>
             </a:r>
             <a:endParaRPr lang="en-AU" sz="2800" dirty="0"/>
           </a:p>
@@ -9499,7 +9483,7 @@
             <a:pPr algn="ctr"/>
             <a:r>
               <a:rPr lang="en-AU" sz="2800" dirty="0" smtClean="0"/>
-              <a:t>Potential Investor</a:t>
+              <a:t>Auto-fill roof area percentages</a:t>
             </a:r>
             <a:endParaRPr lang="en-AU" sz="2800" dirty="0"/>
           </a:p>
@@ -9977,7 +9961,7 @@
             <a:pPr algn="ctr"/>
             <a:r>
               <a:rPr lang="en-AU" sz="2800" dirty="0" smtClean="0"/>
-              <a:t>Salesman</a:t>
+              <a:t>Mobile application</a:t>
             </a:r>
             <a:endParaRPr lang="en-AU" sz="2800" dirty="0"/>
           </a:p>
@@ -10479,7 +10463,7 @@
             <a:pPr algn="ctr"/>
             <a:r>
               <a:rPr lang="en-AU" sz="2800" dirty="0" smtClean="0"/>
-              <a:t>Salesman</a:t>
+              <a:t>Saving reports</a:t>
             </a:r>
             <a:endParaRPr lang="en-AU" sz="2800" dirty="0"/>
           </a:p>
@@ -10981,7 +10965,7 @@
             <a:pPr algn="ctr"/>
             <a:r>
               <a:rPr lang="en-AU" sz="2800" dirty="0" smtClean="0"/>
-              <a:t>Salesman</a:t>
+              <a:t>Printing reports</a:t>
             </a:r>
             <a:endParaRPr lang="en-AU" sz="2800" dirty="0"/>
           </a:p>
@@ -11478,7 +11462,7 @@
             <a:pPr algn="ctr"/>
             <a:r>
               <a:rPr lang="en-AU" sz="2800" dirty="0" smtClean="0"/>
-              <a:t>Salesman</a:t>
+              <a:t>Location input</a:t>
             </a:r>
             <a:endParaRPr lang="en-AU" sz="2800" dirty="0"/>
           </a:p>
@@ -12010,7 +11994,7 @@
             <a:pPr algn="ctr"/>
             <a:r>
               <a:rPr lang="en-AU" sz="2800" dirty="0" smtClean="0"/>
-              <a:t>Salesman</a:t>
+              <a:t>Location fetching</a:t>
             </a:r>
             <a:endParaRPr lang="en-AU" sz="2800" dirty="0"/>
           </a:p>
@@ -12540,7 +12524,7 @@
             <a:pPr algn="ctr"/>
             <a:r>
               <a:rPr lang="en-AU" sz="2800" dirty="0" smtClean="0"/>
-              <a:t>Salesman</a:t>
+              <a:t>Average daylight hours for location</a:t>
             </a:r>
             <a:endParaRPr lang="en-AU" sz="2800" dirty="0"/>
           </a:p>
@@ -13037,7 +13021,7 @@
             <a:pPr algn="ctr"/>
             <a:r>
               <a:rPr lang="en-AU" sz="2800" dirty="0" smtClean="0"/>
-              <a:t>Salesman</a:t>
+              <a:t>System comparison</a:t>
             </a:r>
             <a:endParaRPr lang="en-AU" sz="2800" dirty="0"/>
           </a:p>
@@ -13553,7 +13537,7 @@
             <a:pPr algn="ctr"/>
             <a:r>
               <a:rPr lang="en-AU" sz="2800" dirty="0" smtClean="0"/>
-              <a:t>Salesman</a:t>
+              <a:t>Display monthly savings</a:t>
             </a:r>
             <a:endParaRPr lang="en-AU" sz="2800" dirty="0"/>
           </a:p>
@@ -14035,7 +14019,7 @@
             <a:pPr algn="ctr"/>
             <a:r>
               <a:rPr lang="en-AU" sz="2800" dirty="0" smtClean="0"/>
-              <a:t>Input kW information</a:t>
+              <a:t>System size input</a:t>
             </a:r>
             <a:endParaRPr lang="en-AU" sz="2800" dirty="0"/>
           </a:p>
@@ -14554,7 +14538,7 @@
             <a:pPr algn="ctr"/>
             <a:r>
               <a:rPr lang="en-AU" sz="2800" dirty="0" smtClean="0"/>
-              <a:t>Salesman</a:t>
+              <a:t>Display cumulative annual savings</a:t>
             </a:r>
             <a:endParaRPr lang="en-AU" sz="2800" dirty="0"/>
           </a:p>
@@ -15029,7 +15013,7 @@
             <a:pPr algn="ctr"/>
             <a:r>
               <a:rPr lang="en-AU" sz="2800" dirty="0" smtClean="0"/>
-              <a:t>Salesman</a:t>
+              <a:t>Commercial setup calculations</a:t>
             </a:r>
             <a:endParaRPr lang="en-AU" sz="2800" dirty="0"/>
           </a:p>
@@ -15514,7 +15498,7 @@
             <a:pPr algn="ctr"/>
             <a:r>
               <a:rPr lang="en-AU" sz="2800" dirty="0" smtClean="0"/>
-              <a:t>Current Owner</a:t>
+              <a:t>Efficiency checking</a:t>
             </a:r>
             <a:endParaRPr lang="en-AU" sz="2800" dirty="0"/>
           </a:p>
@@ -16011,7 +15995,7 @@
             <a:pPr algn="ctr"/>
             <a:r>
               <a:rPr lang="en-AU" sz="2800" dirty="0" smtClean="0"/>
-              <a:t>Current Owner</a:t>
+              <a:t>Display panel output </a:t>
             </a:r>
             <a:endParaRPr lang="en-AU" sz="2800" dirty="0"/>
           </a:p>
@@ -16501,9 +16485,10 @@
           <a:p>
             <a:pPr algn="ctr"/>
             <a:r>
-              <a:rPr lang="en-AU" sz="2800" dirty="0"/>
-              <a:t>Potential Investor</a:t>
-            </a:r>
+              <a:rPr lang="en-AU" sz="2800" dirty="0" smtClean="0"/>
+              <a:t>System size fetching</a:t>
+            </a:r>
+            <a:endParaRPr lang="en-AU" sz="2800" dirty="0"/>
           </a:p>
         </p:txBody>
       </p:sp>
@@ -17476,7 +17461,7 @@
             <a:pPr algn="ctr"/>
             <a:r>
               <a:rPr lang="en-AU" sz="2800" dirty="0" smtClean="0"/>
-              <a:t>Potential Investor</a:t>
+              <a:t>Efficiency loss calculation</a:t>
             </a:r>
             <a:endParaRPr lang="en-AU" sz="2800" dirty="0"/>
           </a:p>
@@ -17970,8 +17955,12 @@
               <a:t>Input </a:t>
             </a:r>
             <a:r>
-              <a:rPr lang="en-AU" sz="2800" smtClean="0"/>
-              <a:t>efficiency data</a:t>
+              <a:rPr lang="en-AU" sz="2800" dirty="0" smtClean="0"/>
+              <a:t>efficiency loss </a:t>
+            </a:r>
+            <a:r>
+              <a:rPr lang="en-AU" sz="2800" dirty="0" smtClean="0"/>
+              <a:t>data</a:t>
             </a:r>
             <a:endParaRPr lang="en-AU" sz="2800" dirty="0"/>
           </a:p>
@@ -18462,7 +18451,7 @@
             <a:pPr algn="ctr"/>
             <a:r>
               <a:rPr lang="en-AU" sz="2800" dirty="0" smtClean="0"/>
-              <a:t>Potential Investor</a:t>
+              <a:t>Efficiency loss data fetching</a:t>
             </a:r>
             <a:endParaRPr lang="en-AU" sz="2800" dirty="0"/>
           </a:p>
@@ -18953,7 +18942,11 @@
             <a:pPr algn="ctr"/>
             <a:r>
               <a:rPr lang="en-AU" sz="2800" dirty="0" smtClean="0"/>
-              <a:t>Potential Investor</a:t>
+              <a:t>Panel </a:t>
+            </a:r>
+            <a:r>
+              <a:rPr lang="en-AU" sz="2800" dirty="0" smtClean="0"/>
+              <a:t>lifetime input</a:t>
             </a:r>
             <a:endParaRPr lang="en-AU" sz="2800" dirty="0"/>
           </a:p>

</xml_diff>